<commit_message>
corrected presentation for cog overload
</commit_message>
<xml_diff>
--- a/_site/portfolio/presentations/min_cog_overload/min_cog_overload.pptx
+++ b/_site/portfolio/presentations/min_cog_overload/min_cog_overload.pptx
@@ -5,7 +5,7 @@
     <p:sldMasterId id="2147483648" r:id="rId1"/>
   </p:sldMasterIdLst>
   <p:notesMasterIdLst>
-    <p:notesMasterId r:id="rId36"/>
+    <p:notesMasterId r:id="rId35"/>
   </p:notesMasterIdLst>
   <p:sldIdLst>
     <p:sldId id="256" r:id="rId2"/>
@@ -34,14 +34,13 @@
     <p:sldId id="445" r:id="rId25"/>
     <p:sldId id="443" r:id="rId26"/>
     <p:sldId id="446" r:id="rId27"/>
-    <p:sldId id="447" r:id="rId28"/>
-    <p:sldId id="448" r:id="rId29"/>
-    <p:sldId id="449" r:id="rId30"/>
-    <p:sldId id="450" r:id="rId31"/>
-    <p:sldId id="452" r:id="rId32"/>
-    <p:sldId id="401" r:id="rId33"/>
-    <p:sldId id="418" r:id="rId34"/>
-    <p:sldId id="417" r:id="rId35"/>
+    <p:sldId id="448" r:id="rId28"/>
+    <p:sldId id="449" r:id="rId29"/>
+    <p:sldId id="450" r:id="rId30"/>
+    <p:sldId id="452" r:id="rId31"/>
+    <p:sldId id="401" r:id="rId32"/>
+    <p:sldId id="418" r:id="rId33"/>
+    <p:sldId id="417" r:id="rId34"/>
   </p:sldIdLst>
   <p:sldSz cx="12192000" cy="6858000"/>
   <p:notesSz cx="6858000" cy="9144000"/>
@@ -242,7 +241,7 @@
           <a:p>
             <a:fld id="{895EAF12-57FF-4E6D-B8A3-8CBCA84A44AF}" type="datetimeFigureOut">
               <a:rPr lang="en-US" smtClean="0"/>
-              <a:t>9/29/2023</a:t>
+              <a:t>1/4/2025</a:t>
             </a:fld>
             <a:endParaRPr lang="en-US"/>
           </a:p>
@@ -2110,7 +2109,7 @@
     </p:spTree>
     <p:extLst>
       <p:ext uri="{BB962C8B-B14F-4D97-AF65-F5344CB8AC3E}">
-        <p14:creationId xmlns:p14="http://schemas.microsoft.com/office/powerpoint/2010/main" val="184285315"/>
+        <p14:creationId xmlns:p14="http://schemas.microsoft.com/office/powerpoint/2010/main" val="3449344993"/>
       </p:ext>
     </p:extLst>
   </p:cSld>
@@ -2194,7 +2193,7 @@
     </p:spTree>
     <p:extLst>
       <p:ext uri="{BB962C8B-B14F-4D97-AF65-F5344CB8AC3E}">
-        <p14:creationId xmlns:p14="http://schemas.microsoft.com/office/powerpoint/2010/main" val="3449344993"/>
+        <p14:creationId xmlns:p14="http://schemas.microsoft.com/office/powerpoint/2010/main" val="1796795035"/>
       </p:ext>
     </p:extLst>
   </p:cSld>
@@ -2248,6 +2247,10 @@
           <a:bodyPr/>
           <a:lstStyle/>
           <a:p>
+            <a:pPr marL="342900" indent="-342900">
+              <a:buFont typeface="Arial" panose="020B0604020202020204" pitchFamily="34" charset="0"/>
+              <a:buChar char="•"/>
+            </a:pPr>
             <a:endParaRPr lang="en-US" dirty="0"/>
           </a:p>
         </p:txBody>
@@ -2278,7 +2281,7 @@
     </p:spTree>
     <p:extLst>
       <p:ext uri="{BB962C8B-B14F-4D97-AF65-F5344CB8AC3E}">
-        <p14:creationId xmlns:p14="http://schemas.microsoft.com/office/powerpoint/2010/main" val="1796795035"/>
+        <p14:creationId xmlns:p14="http://schemas.microsoft.com/office/powerpoint/2010/main" val="640995466"/>
       </p:ext>
     </p:extLst>
   </p:cSld>
@@ -2332,9 +2335,9 @@
           <a:bodyPr/>
           <a:lstStyle/>
           <a:p>
-            <a:pPr marL="342900" indent="-342900">
+            <a:pPr marL="0" indent="0">
               <a:buFont typeface="Arial" panose="020B0604020202020204" pitchFamily="34" charset="0"/>
-              <a:buChar char="•"/>
+              <a:buNone/>
             </a:pPr>
             <a:endParaRPr lang="en-US" dirty="0"/>
           </a:p>
@@ -2366,7 +2369,7 @@
     </p:spTree>
     <p:extLst>
       <p:ext uri="{BB962C8B-B14F-4D97-AF65-F5344CB8AC3E}">
-        <p14:creationId xmlns:p14="http://schemas.microsoft.com/office/powerpoint/2010/main" val="640995466"/>
+        <p14:creationId xmlns:p14="http://schemas.microsoft.com/office/powerpoint/2010/main" val="4282115455"/>
       </p:ext>
     </p:extLst>
   </p:cSld>
@@ -2504,10 +2507,6 @@
           <a:bodyPr/>
           <a:lstStyle/>
           <a:p>
-            <a:pPr marL="0" indent="0">
-              <a:buFont typeface="Arial" panose="020B0604020202020204" pitchFamily="34" charset="0"/>
-              <a:buNone/>
-            </a:pPr>
             <a:endParaRPr lang="en-US" dirty="0"/>
           </a:p>
         </p:txBody>
@@ -2538,7 +2537,7 @@
     </p:spTree>
     <p:extLst>
       <p:ext uri="{BB962C8B-B14F-4D97-AF65-F5344CB8AC3E}">
-        <p14:creationId xmlns:p14="http://schemas.microsoft.com/office/powerpoint/2010/main" val="4282115455"/>
+        <p14:creationId xmlns:p14="http://schemas.microsoft.com/office/powerpoint/2010/main" val="1261310652"/>
       </p:ext>
     </p:extLst>
   </p:cSld>
@@ -2622,7 +2621,7 @@
     </p:spTree>
     <p:extLst>
       <p:ext uri="{BB962C8B-B14F-4D97-AF65-F5344CB8AC3E}">
-        <p14:creationId xmlns:p14="http://schemas.microsoft.com/office/powerpoint/2010/main" val="1261310652"/>
+        <p14:creationId xmlns:p14="http://schemas.microsoft.com/office/powerpoint/2010/main" val="1433883588"/>
       </p:ext>
     </p:extLst>
   </p:cSld>
@@ -2698,90 +2697,6 @@
             <a:fld id="{E7A33D9F-15B6-414B-8460-13DF49E75526}" type="slidenum">
               <a:rPr lang="en-US" smtClean="0"/>
               <a:t>33</a:t>
-            </a:fld>
-            <a:endParaRPr lang="en-US" dirty="0"/>
-          </a:p>
-        </p:txBody>
-      </p:sp>
-    </p:spTree>
-    <p:extLst>
-      <p:ext uri="{BB962C8B-B14F-4D97-AF65-F5344CB8AC3E}">
-        <p14:creationId xmlns:p14="http://schemas.microsoft.com/office/powerpoint/2010/main" val="1433883588"/>
-      </p:ext>
-    </p:extLst>
-  </p:cSld>
-  <p:clrMapOvr>
-    <a:masterClrMapping/>
-  </p:clrMapOvr>
-</p:notes>
-</file>
-
-<file path=ppt/notesSlides/notesSlide33.xml><?xml version="1.0" encoding="utf-8"?>
-<p:notes xmlns:a="http://schemas.openxmlformats.org/drawingml/2006/main" xmlns:r="http://schemas.openxmlformats.org/officeDocument/2006/relationships" xmlns:p="http://schemas.openxmlformats.org/presentationml/2006/main">
-  <p:cSld>
-    <p:spTree>
-      <p:nvGrpSpPr>
-        <p:cNvPr id="1" name=""/>
-        <p:cNvGrpSpPr/>
-        <p:nvPr/>
-      </p:nvGrpSpPr>
-      <p:grpSpPr>
-        <a:xfrm>
-          <a:off x="0" y="0"/>
-          <a:ext cx="0" cy="0"/>
-          <a:chOff x="0" y="0"/>
-          <a:chExt cx="0" cy="0"/>
-        </a:xfrm>
-      </p:grpSpPr>
-      <p:sp>
-        <p:nvSpPr>
-          <p:cNvPr id="2" name="Slide Image Placeholder 1"/>
-          <p:cNvSpPr>
-            <a:spLocks noGrp="1" noRot="1" noChangeAspect="1"/>
-          </p:cNvSpPr>
-          <p:nvPr>
-            <p:ph type="sldImg"/>
-          </p:nvPr>
-        </p:nvSpPr>
-        <p:spPr/>
-      </p:sp>
-      <p:sp>
-        <p:nvSpPr>
-          <p:cNvPr id="3" name="Notes Placeholder 2"/>
-          <p:cNvSpPr>
-            <a:spLocks noGrp="1"/>
-          </p:cNvSpPr>
-          <p:nvPr>
-            <p:ph type="body" idx="1"/>
-          </p:nvPr>
-        </p:nvSpPr>
-        <p:spPr/>
-        <p:txBody>
-          <a:bodyPr/>
-          <a:lstStyle/>
-          <a:p>
-            <a:endParaRPr lang="en-US" dirty="0"/>
-          </a:p>
-        </p:txBody>
-      </p:sp>
-      <p:sp>
-        <p:nvSpPr>
-          <p:cNvPr id="4" name="Slide Number Placeholder 3"/>
-          <p:cNvSpPr>
-            <a:spLocks noGrp="1"/>
-          </p:cNvSpPr>
-          <p:nvPr>
-            <p:ph type="sldNum" sz="quarter" idx="5"/>
-          </p:nvPr>
-        </p:nvSpPr>
-        <p:spPr/>
-        <p:txBody>
-          <a:bodyPr/>
-          <a:lstStyle/>
-          <a:p>
-            <a:fld id="{E7A33D9F-15B6-414B-8460-13DF49E75526}" type="slidenum">
-              <a:rPr lang="en-US" smtClean="0"/>
-              <a:t>34</a:t>
             </a:fld>
             <a:endParaRPr lang="en-US" dirty="0"/>
           </a:p>
@@ -3451,7 +3366,7 @@
           <a:p>
             <a:fld id="{D8F22D0D-4AD2-4BB4-88FB-0479408658C1}" type="datetime1">
               <a:rPr lang="en-US" smtClean="0"/>
-              <a:t>9/29/2023</a:t>
+              <a:t>1/4/2025</a:t>
             </a:fld>
             <a:endParaRPr lang="en-US"/>
           </a:p>
@@ -3649,7 +3564,7 @@
           <a:p>
             <a:fld id="{A6653024-DD3C-4DC1-97CA-9FB8A346BFA5}" type="datetime1">
               <a:rPr lang="en-US" smtClean="0"/>
-              <a:t>9/29/2023</a:t>
+              <a:t>1/4/2025</a:t>
             </a:fld>
             <a:endParaRPr lang="en-US"/>
           </a:p>
@@ -3857,7 +3772,7 @@
           <a:p>
             <a:fld id="{9E716345-46CF-42F6-A51B-C0AC5285C6F4}" type="datetime1">
               <a:rPr lang="en-US" smtClean="0"/>
-              <a:t>9/29/2023</a:t>
+              <a:t>1/4/2025</a:t>
             </a:fld>
             <a:endParaRPr lang="en-US"/>
           </a:p>
@@ -4055,7 +3970,7 @@
           <a:p>
             <a:fld id="{52AD81F6-8DB8-4004-BE3F-47C209F4D5B1}" type="datetime1">
               <a:rPr lang="en-US" smtClean="0"/>
-              <a:t>9/29/2023</a:t>
+              <a:t>1/4/2025</a:t>
             </a:fld>
             <a:endParaRPr lang="en-US"/>
           </a:p>
@@ -4330,7 +4245,7 @@
           <a:p>
             <a:fld id="{3593D088-A180-4A2E-B0ED-20C6BCAD9365}" type="datetime1">
               <a:rPr lang="en-US" smtClean="0"/>
-              <a:t>9/29/2023</a:t>
+              <a:t>1/4/2025</a:t>
             </a:fld>
             <a:endParaRPr lang="en-US"/>
           </a:p>
@@ -4595,7 +4510,7 @@
           <a:p>
             <a:fld id="{0625ABA2-52EA-490A-A8D2-6D2A2AC8EE98}" type="datetime1">
               <a:rPr lang="en-US" smtClean="0"/>
-              <a:t>9/29/2023</a:t>
+              <a:t>1/4/2025</a:t>
             </a:fld>
             <a:endParaRPr lang="en-US"/>
           </a:p>
@@ -5007,7 +4922,7 @@
           <a:p>
             <a:fld id="{6A613BAD-5ACE-4F34-A2B5-8DD145878E1F}" type="datetime1">
               <a:rPr lang="en-US" smtClean="0"/>
-              <a:t>9/29/2023</a:t>
+              <a:t>1/4/2025</a:t>
             </a:fld>
             <a:endParaRPr lang="en-US"/>
           </a:p>
@@ -5148,7 +5063,7 @@
           <a:p>
             <a:fld id="{8F6FE0B0-6782-4C99-A89C-C8052BAED5FF}" type="datetime1">
               <a:rPr lang="en-US" smtClean="0"/>
-              <a:t>9/29/2023</a:t>
+              <a:t>1/4/2025</a:t>
             </a:fld>
             <a:endParaRPr lang="en-US"/>
           </a:p>
@@ -5261,7 +5176,7 @@
           <a:p>
             <a:fld id="{63C18A5D-0314-41F8-A071-EC653D490370}" type="datetime1">
               <a:rPr lang="en-US" smtClean="0"/>
-              <a:t>9/29/2023</a:t>
+              <a:t>1/4/2025</a:t>
             </a:fld>
             <a:endParaRPr lang="en-US"/>
           </a:p>
@@ -5572,7 +5487,7 @@
           <a:p>
             <a:fld id="{57976E0B-A371-4BCA-8793-7E638CA7C242}" type="datetime1">
               <a:rPr lang="en-US" smtClean="0"/>
-              <a:t>9/29/2023</a:t>
+              <a:t>1/4/2025</a:t>
             </a:fld>
             <a:endParaRPr lang="en-US"/>
           </a:p>
@@ -5860,7 +5775,7 @@
           <a:p>
             <a:fld id="{DEF06E03-7D51-47C4-A73B-5569465A341E}" type="datetime1">
               <a:rPr lang="en-US" smtClean="0"/>
-              <a:t>9/29/2023</a:t>
+              <a:t>1/4/2025</a:t>
             </a:fld>
             <a:endParaRPr lang="en-US"/>
           </a:p>
@@ -6101,7 +6016,7 @@
           <a:p>
             <a:fld id="{539DCC4D-8EDE-4BDB-8BC9-12D0FFF5DFFE}" type="datetime1">
               <a:rPr lang="en-US" smtClean="0"/>
-              <a:t>9/29/2023</a:t>
+              <a:t>1/4/2025</a:t>
             </a:fld>
             <a:endParaRPr lang="en-US"/>
           </a:p>
@@ -15957,7 +15872,7 @@
                 <a:ea typeface="Helvetica" charset="0"/>
                 <a:cs typeface="Helvetica" charset="0"/>
               </a:rPr>
-              <a:t>3. Formative Assessments</a:t>
+              <a:t>4. Improving course content and delivery</a:t>
             </a:r>
           </a:p>
         </p:txBody>
@@ -15986,301 +15901,6 @@
             <a:fld id="{8CC1885C-3B05-4A16-B158-00E7A5862FD7}" type="slidenum">
               <a:rPr lang="en-US" smtClean="0"/>
               <a:t>27</a:t>
-            </a:fld>
-            <a:endParaRPr lang="en-US"/>
-          </a:p>
-        </p:txBody>
-      </p:sp>
-      <p:sp>
-        <p:nvSpPr>
-          <p:cNvPr id="10" name="TextBox 9">
-            <a:extLst>
-              <a:ext uri="{FF2B5EF4-FFF2-40B4-BE49-F238E27FC236}">
-                <a16:creationId xmlns:a16="http://schemas.microsoft.com/office/drawing/2014/main" id="{CBCB63FA-3888-3B7D-2677-6146533A0E74}"/>
-              </a:ext>
-            </a:extLst>
-          </p:cNvPr>
-          <p:cNvSpPr txBox="1"/>
-          <p:nvPr/>
-        </p:nvSpPr>
-        <p:spPr>
-          <a:xfrm>
-            <a:off x="267702" y="724094"/>
-            <a:ext cx="11656595" cy="461665"/>
-          </a:xfrm>
-          <a:prstGeom prst="rect">
-            <a:avLst/>
-          </a:prstGeom>
-          <a:noFill/>
-        </p:spPr>
-        <p:txBody>
-          <a:bodyPr wrap="square" rtlCol="0">
-            <a:spAutoFit/>
-          </a:bodyPr>
-          <a:lstStyle/>
-          <a:p>
-            <a:pPr algn="ctr"/>
-            <a:r>
-              <a:rPr lang="en-US" sz="2400" u="sng" dirty="0">
-                <a:latin typeface="Helvetica" charset="0"/>
-                <a:ea typeface="Helvetica" charset="0"/>
-                <a:cs typeface="Helvetica" charset="0"/>
-              </a:rPr>
-              <a:t>Memory management</a:t>
-            </a:r>
-          </a:p>
-        </p:txBody>
-      </p:sp>
-      <p:pic>
-        <p:nvPicPr>
-          <p:cNvPr id="14" name="Picture 13">
-            <a:extLst>
-              <a:ext uri="{FF2B5EF4-FFF2-40B4-BE49-F238E27FC236}">
-                <a16:creationId xmlns:a16="http://schemas.microsoft.com/office/drawing/2014/main" id="{174CF7F6-68B7-E519-7F18-9484ABF338A2}"/>
-              </a:ext>
-            </a:extLst>
-          </p:cNvPr>
-          <p:cNvPicPr>
-            <a:picLocks noChangeAspect="1"/>
-          </p:cNvPicPr>
-          <p:nvPr/>
-        </p:nvPicPr>
-        <p:blipFill>
-          <a:blip r:embed="rId3"/>
-          <a:stretch>
-            <a:fillRect/>
-          </a:stretch>
-        </p:blipFill>
-        <p:spPr>
-          <a:xfrm>
-            <a:off x="2864980" y="2315648"/>
-            <a:ext cx="4544059" cy="3610479"/>
-          </a:xfrm>
-          <a:prstGeom prst="rect">
-            <a:avLst/>
-          </a:prstGeom>
-        </p:spPr>
-      </p:pic>
-      <p:pic>
-        <p:nvPicPr>
-          <p:cNvPr id="16" name="Picture 15">
-            <a:extLst>
-              <a:ext uri="{FF2B5EF4-FFF2-40B4-BE49-F238E27FC236}">
-                <a16:creationId xmlns:a16="http://schemas.microsoft.com/office/drawing/2014/main" id="{21DB6C2D-4483-CA09-0FB2-ED1D64D096D7}"/>
-              </a:ext>
-            </a:extLst>
-          </p:cNvPr>
-          <p:cNvPicPr>
-            <a:picLocks noChangeAspect="1"/>
-          </p:cNvPicPr>
-          <p:nvPr/>
-        </p:nvPicPr>
-        <p:blipFill>
-          <a:blip r:embed="rId4"/>
-          <a:stretch>
-            <a:fillRect/>
-          </a:stretch>
-        </p:blipFill>
-        <p:spPr>
-          <a:xfrm>
-            <a:off x="7848872" y="2315648"/>
-            <a:ext cx="3982006" cy="2896004"/>
-          </a:xfrm>
-          <a:prstGeom prst="rect">
-            <a:avLst/>
-          </a:prstGeom>
-        </p:spPr>
-      </p:pic>
-      <p:sp>
-        <p:nvSpPr>
-          <p:cNvPr id="2" name="TextBox 1">
-            <a:extLst>
-              <a:ext uri="{FF2B5EF4-FFF2-40B4-BE49-F238E27FC236}">
-                <a16:creationId xmlns:a16="http://schemas.microsoft.com/office/drawing/2014/main" id="{0A86FC28-8A0F-070A-530D-42BB8DF89A5A}"/>
-              </a:ext>
-            </a:extLst>
-          </p:cNvPr>
-          <p:cNvSpPr txBox="1"/>
-          <p:nvPr/>
-        </p:nvSpPr>
-        <p:spPr>
-          <a:xfrm>
-            <a:off x="267702" y="3890054"/>
-            <a:ext cx="2329724" cy="461665"/>
-          </a:xfrm>
-          <a:prstGeom prst="rect">
-            <a:avLst/>
-          </a:prstGeom>
-          <a:noFill/>
-          <a:ln>
-            <a:noFill/>
-          </a:ln>
-        </p:spPr>
-        <p:txBody>
-          <a:bodyPr wrap="square">
-            <a:spAutoFit/>
-          </a:bodyPr>
-          <a:lstStyle/>
-          <a:p>
-            <a:r>
-              <a:rPr lang="en-US" sz="2400" b="0" i="0" dirty="0">
-                <a:solidFill>
-                  <a:srgbClr val="202124"/>
-                </a:solidFill>
-                <a:effectLst/>
-                <a:latin typeface="Helvetica" panose="020B0604020202020204" pitchFamily="34" charset="0"/>
-                <a:cs typeface="Helvetica" panose="020B0604020202020204" pitchFamily="34" charset="0"/>
-              </a:rPr>
-              <a:t>Faded Example</a:t>
-            </a:r>
-            <a:endParaRPr lang="en-US" sz="2400" dirty="0">
-              <a:latin typeface="Helvetica" panose="020B0604020202020204" pitchFamily="34" charset="0"/>
-              <a:cs typeface="Helvetica" panose="020B0604020202020204" pitchFamily="34" charset="0"/>
-            </a:endParaRPr>
-          </a:p>
-        </p:txBody>
-      </p:sp>
-      <p:sp>
-        <p:nvSpPr>
-          <p:cNvPr id="7" name="TextBox 6">
-            <a:extLst>
-              <a:ext uri="{FF2B5EF4-FFF2-40B4-BE49-F238E27FC236}">
-                <a16:creationId xmlns:a16="http://schemas.microsoft.com/office/drawing/2014/main" id="{6B683A80-62D2-32DC-AA32-88E3683E0E26}"/>
-              </a:ext>
-            </a:extLst>
-          </p:cNvPr>
-          <p:cNvSpPr txBox="1"/>
-          <p:nvPr/>
-        </p:nvSpPr>
-        <p:spPr>
-          <a:xfrm>
-            <a:off x="-1" y="6499156"/>
-            <a:ext cx="6480313" cy="338554"/>
-          </a:xfrm>
-          <a:prstGeom prst="rect">
-            <a:avLst/>
-          </a:prstGeom>
-          <a:noFill/>
-        </p:spPr>
-        <p:txBody>
-          <a:bodyPr wrap="square">
-            <a:spAutoFit/>
-          </a:bodyPr>
-          <a:lstStyle/>
-          <a:p>
-            <a:r>
-              <a:rPr lang="en-US" sz="1600" dirty="0">
-                <a:latin typeface="Helvetica" panose="020B0604020202020204" pitchFamily="34" charset="0"/>
-                <a:cs typeface="Helvetica" panose="020B0604020202020204" pitchFamily="34" charset="0"/>
-              </a:rPr>
-              <a:t>1. </a:t>
-            </a:r>
-            <a:r>
-              <a:rPr lang="en-US" sz="1600" dirty="0">
-                <a:latin typeface="Helvetica" panose="020B0604020202020204" pitchFamily="34" charset="0"/>
-                <a:cs typeface="Helvetica" panose="020B0604020202020204" pitchFamily="34" charset="0"/>
-                <a:hlinkClick r:id="rId5"/>
-              </a:rPr>
-              <a:t>https://taylorda01.weebly.com/backward-faded-maths.html</a:t>
-            </a:r>
-            <a:r>
-              <a:rPr lang="en-US" sz="1600" dirty="0">
-                <a:latin typeface="Helvetica" panose="020B0604020202020204" pitchFamily="34" charset="0"/>
-                <a:cs typeface="Helvetica" panose="020B0604020202020204" pitchFamily="34" charset="0"/>
-              </a:rPr>
-              <a:t> </a:t>
-            </a:r>
-          </a:p>
-        </p:txBody>
-      </p:sp>
-    </p:spTree>
-    <p:extLst>
-      <p:ext uri="{BB962C8B-B14F-4D97-AF65-F5344CB8AC3E}">
-        <p14:creationId xmlns:p14="http://schemas.microsoft.com/office/powerpoint/2010/main" val="4029228988"/>
-      </p:ext>
-    </p:extLst>
-  </p:cSld>
-  <p:clrMapOvr>
-    <a:masterClrMapping/>
-  </p:clrMapOvr>
-</p:sld>
-</file>
-
-<file path=ppt/slides/slide28.xml><?xml version="1.0" encoding="utf-8"?>
-<p:sld xmlns:a="http://schemas.openxmlformats.org/drawingml/2006/main" xmlns:r="http://schemas.openxmlformats.org/officeDocument/2006/relationships" xmlns:p="http://schemas.openxmlformats.org/presentationml/2006/main">
-  <p:cSld>
-    <p:spTree>
-      <p:nvGrpSpPr>
-        <p:cNvPr id="1" name=""/>
-        <p:cNvGrpSpPr/>
-        <p:nvPr/>
-      </p:nvGrpSpPr>
-      <p:grpSpPr>
-        <a:xfrm>
-          <a:off x="0" y="0"/>
-          <a:ext cx="0" cy="0"/>
-          <a:chOff x="0" y="0"/>
-          <a:chExt cx="0" cy="0"/>
-        </a:xfrm>
-      </p:grpSpPr>
-      <p:sp>
-        <p:nvSpPr>
-          <p:cNvPr id="4" name="Title 1"/>
-          <p:cNvSpPr>
-            <a:spLocks noGrp="1"/>
-          </p:cNvSpPr>
-          <p:nvPr>
-            <p:ph type="title"/>
-          </p:nvPr>
-        </p:nvSpPr>
-        <p:spPr>
-          <a:xfrm>
-            <a:off x="0" y="4005"/>
-            <a:ext cx="12192000" cy="720089"/>
-          </a:xfrm>
-        </p:spPr>
-        <p:txBody>
-          <a:bodyPr>
-            <a:noAutofit/>
-          </a:bodyPr>
-          <a:lstStyle/>
-          <a:p>
-            <a:pPr algn="ctr"/>
-            <a:r>
-              <a:rPr lang="en-US" sz="3600" dirty="0">
-                <a:latin typeface="Helvetica" charset="0"/>
-                <a:ea typeface="Helvetica" charset="0"/>
-                <a:cs typeface="Helvetica" charset="0"/>
-              </a:rPr>
-              <a:t>4. Improving course content and delivery</a:t>
-            </a:r>
-          </a:p>
-        </p:txBody>
-      </p:sp>
-      <p:sp>
-        <p:nvSpPr>
-          <p:cNvPr id="6" name="Slide Number Placeholder 5">
-            <a:extLst>
-              <a:ext uri="{FF2B5EF4-FFF2-40B4-BE49-F238E27FC236}">
-                <a16:creationId xmlns:a16="http://schemas.microsoft.com/office/drawing/2014/main" id="{EBBB42AB-36A3-A6C3-059C-66788BD22FA8}"/>
-              </a:ext>
-            </a:extLst>
-          </p:cNvPr>
-          <p:cNvSpPr>
-            <a:spLocks noGrp="1"/>
-          </p:cNvSpPr>
-          <p:nvPr>
-            <p:ph type="sldNum" sz="quarter" idx="12"/>
-          </p:nvPr>
-        </p:nvSpPr>
-        <p:spPr/>
-        <p:txBody>
-          <a:bodyPr/>
-          <a:lstStyle/>
-          <a:p>
-            <a:fld id="{8CC1885C-3B05-4A16-B158-00E7A5862FD7}" type="slidenum">
-              <a:rPr lang="en-US" smtClean="0"/>
-              <a:t>28</a:t>
             </a:fld>
             <a:endParaRPr lang="en-US"/>
           </a:p>
@@ -16504,7 +16124,7 @@
 </p:sld>
 </file>
 
-<file path=ppt/slides/slide29.xml><?xml version="1.0" encoding="utf-8"?>
+<file path=ppt/slides/slide28.xml><?xml version="1.0" encoding="utf-8"?>
 <p:sld xmlns:a="http://schemas.openxmlformats.org/drawingml/2006/main" xmlns:r="http://schemas.openxmlformats.org/officeDocument/2006/relationships" xmlns:p="http://schemas.openxmlformats.org/presentationml/2006/main">
   <p:cSld>
     <p:spTree>
@@ -16578,7 +16198,7 @@
           <a:p>
             <a:fld id="{8CC1885C-3B05-4A16-B158-00E7A5862FD7}" type="slidenum">
               <a:rPr lang="en-US" smtClean="0"/>
-              <a:t>29</a:t>
+              <a:t>28</a:t>
             </a:fld>
             <a:endParaRPr lang="en-US"/>
           </a:p>
@@ -16773,7 +16393,7 @@
 </p:sld>
 </file>
 
-<file path=ppt/slides/slide3.xml><?xml version="1.0" encoding="utf-8"?>
+<file path=ppt/slides/slide29.xml><?xml version="1.0" encoding="utf-8"?>
 <p:sld xmlns:a="http://schemas.openxmlformats.org/drawingml/2006/main" xmlns:r="http://schemas.openxmlformats.org/officeDocument/2006/relationships" xmlns:p="http://schemas.openxmlformats.org/presentationml/2006/main">
   <p:cSld>
     <p:spTree>
@@ -16802,253 +16422,6 @@
         </p:nvSpPr>
         <p:spPr>
           <a:xfrm>
-            <a:off x="826770" y="6104"/>
-            <a:ext cx="10515600" cy="720089"/>
-          </a:xfrm>
-        </p:spPr>
-        <p:txBody>
-          <a:bodyPr>
-            <a:noAutofit/>
-          </a:bodyPr>
-          <a:lstStyle/>
-          <a:p>
-            <a:pPr algn="ctr"/>
-            <a:r>
-              <a:rPr lang="en-US" sz="3600" dirty="0">
-                <a:latin typeface="Helvetica" charset="0"/>
-                <a:ea typeface="Helvetica" charset="0"/>
-                <a:cs typeface="Helvetica" charset="0"/>
-              </a:rPr>
-              <a:t>Outline</a:t>
-            </a:r>
-          </a:p>
-        </p:txBody>
-      </p:sp>
-      <p:sp>
-        <p:nvSpPr>
-          <p:cNvPr id="5" name="TextBox 4"/>
-          <p:cNvSpPr txBox="1"/>
-          <p:nvPr/>
-        </p:nvSpPr>
-        <p:spPr>
-          <a:xfrm>
-            <a:off x="256272" y="1062488"/>
-            <a:ext cx="11656595" cy="4524315"/>
-          </a:xfrm>
-          <a:prstGeom prst="rect">
-            <a:avLst/>
-          </a:prstGeom>
-          <a:noFill/>
-        </p:spPr>
-        <p:txBody>
-          <a:bodyPr wrap="square" rtlCol="0">
-            <a:spAutoFit/>
-          </a:bodyPr>
-          <a:lstStyle/>
-          <a:p>
-            <a:r>
-              <a:rPr lang="en-US" sz="2400" dirty="0">
-                <a:latin typeface="Helvetica" charset="0"/>
-                <a:ea typeface="Helvetica" charset="0"/>
-                <a:cs typeface="Helvetica" charset="0"/>
-              </a:rPr>
-              <a:t>Part I: Theories of Memory Processing and Learning</a:t>
-            </a:r>
-          </a:p>
-          <a:p>
-            <a:endParaRPr lang="en-US" sz="2400" dirty="0">
-              <a:latin typeface="Helvetica" charset="0"/>
-              <a:ea typeface="Helvetica" charset="0"/>
-              <a:cs typeface="Helvetica" charset="0"/>
-            </a:endParaRPr>
-          </a:p>
-          <a:p>
-            <a:pPr marL="914400" lvl="1" indent="-457200">
-              <a:buFont typeface="+mj-lt"/>
-              <a:buAutoNum type="arabicPeriod"/>
-            </a:pPr>
-            <a:r>
-              <a:rPr lang="en-US" sz="2400" dirty="0">
-                <a:latin typeface="Helvetica" charset="0"/>
-                <a:ea typeface="Helvetica" charset="0"/>
-                <a:cs typeface="Helvetica" charset="0"/>
-              </a:rPr>
-              <a:t>Information Processing Theory</a:t>
-            </a:r>
-          </a:p>
-          <a:p>
-            <a:pPr marL="914400" lvl="1" indent="-457200">
-              <a:buFont typeface="+mj-lt"/>
-              <a:buAutoNum type="arabicPeriod"/>
-            </a:pPr>
-            <a:r>
-              <a:rPr lang="en-US" sz="2400" dirty="0">
-                <a:latin typeface="Helvetica" charset="0"/>
-                <a:ea typeface="Helvetica" charset="0"/>
-                <a:cs typeface="Helvetica" charset="0"/>
-              </a:rPr>
-              <a:t>Cognitive Load Theory</a:t>
-            </a:r>
-          </a:p>
-          <a:p>
-            <a:endParaRPr lang="en-US" sz="2400" dirty="0">
-              <a:latin typeface="Helvetica" charset="0"/>
-              <a:ea typeface="Helvetica" charset="0"/>
-              <a:cs typeface="Helvetica" charset="0"/>
-            </a:endParaRPr>
-          </a:p>
-          <a:p>
-            <a:r>
-              <a:rPr lang="en-US" sz="2400" dirty="0">
-                <a:latin typeface="Helvetica" charset="0"/>
-                <a:ea typeface="Helvetica" charset="0"/>
-                <a:cs typeface="Helvetica" charset="0"/>
-              </a:rPr>
-              <a:t>Part II: Cognitive Load Theory and Course Design</a:t>
-            </a:r>
-          </a:p>
-          <a:p>
-            <a:endParaRPr lang="en-US" sz="2400" dirty="0">
-              <a:latin typeface="Helvetica" charset="0"/>
-              <a:ea typeface="Helvetica" charset="0"/>
-              <a:cs typeface="Helvetica" charset="0"/>
-            </a:endParaRPr>
-          </a:p>
-          <a:p>
-            <a:pPr marL="914400" lvl="1" indent="-457200">
-              <a:buAutoNum type="arabicPeriod"/>
-            </a:pPr>
-            <a:r>
-              <a:rPr lang="en-US" sz="2400" dirty="0">
-                <a:latin typeface="Helvetica" charset="0"/>
-                <a:ea typeface="Helvetica" charset="0"/>
-                <a:cs typeface="Helvetica" charset="0"/>
-              </a:rPr>
-              <a:t>Identify Learner Personas / Types</a:t>
-            </a:r>
-          </a:p>
-          <a:p>
-            <a:pPr marL="914400" lvl="1" indent="-457200">
-              <a:buAutoNum type="arabicPeriod"/>
-            </a:pPr>
-            <a:r>
-              <a:rPr lang="en-US" sz="2400" dirty="0">
-                <a:latin typeface="Helvetica" charset="0"/>
-                <a:ea typeface="Helvetica" charset="0"/>
-                <a:cs typeface="Helvetica" charset="0"/>
-              </a:rPr>
-              <a:t>Mental Models</a:t>
-            </a:r>
-          </a:p>
-          <a:p>
-            <a:pPr marL="914400" lvl="1" indent="-457200">
-              <a:buAutoNum type="arabicPeriod"/>
-            </a:pPr>
-            <a:r>
-              <a:rPr lang="en-US" sz="2400" dirty="0">
-                <a:latin typeface="Helvetica" charset="0"/>
-                <a:ea typeface="Helvetica" charset="0"/>
-                <a:cs typeface="Helvetica" charset="0"/>
-              </a:rPr>
-              <a:t>Formative Assessments</a:t>
-            </a:r>
-          </a:p>
-          <a:p>
-            <a:pPr marL="914400" lvl="1" indent="-457200">
-              <a:buAutoNum type="arabicPeriod"/>
-            </a:pPr>
-            <a:r>
-              <a:rPr lang="en-US" sz="2400" dirty="0">
-                <a:latin typeface="Helvetica" charset="0"/>
-                <a:ea typeface="Helvetica" charset="0"/>
-                <a:cs typeface="Helvetica" charset="0"/>
-              </a:rPr>
-              <a:t>Improving Course Content and Delivery</a:t>
-            </a:r>
-          </a:p>
-          <a:p>
-            <a:pPr marL="914400" lvl="1" indent="-457200">
-              <a:buAutoNum type="arabicPeriod"/>
-            </a:pPr>
-            <a:endParaRPr lang="en-US" sz="2400" dirty="0">
-              <a:latin typeface="Helvetica" charset="0"/>
-              <a:ea typeface="Helvetica" charset="0"/>
-              <a:cs typeface="Helvetica" charset="0"/>
-            </a:endParaRPr>
-          </a:p>
-        </p:txBody>
-      </p:sp>
-      <p:sp>
-        <p:nvSpPr>
-          <p:cNvPr id="2" name="Slide Number Placeholder 1">
-            <a:extLst>
-              <a:ext uri="{FF2B5EF4-FFF2-40B4-BE49-F238E27FC236}">
-                <a16:creationId xmlns:a16="http://schemas.microsoft.com/office/drawing/2014/main" id="{6B712D85-1377-B21F-12ED-DAEADA66B7C5}"/>
-              </a:ext>
-            </a:extLst>
-          </p:cNvPr>
-          <p:cNvSpPr>
-            <a:spLocks noGrp="1"/>
-          </p:cNvSpPr>
-          <p:nvPr>
-            <p:ph type="sldNum" sz="quarter" idx="12"/>
-          </p:nvPr>
-        </p:nvSpPr>
-        <p:spPr/>
-        <p:txBody>
-          <a:bodyPr/>
-          <a:lstStyle/>
-          <a:p>
-            <a:fld id="{8CC1885C-3B05-4A16-B158-00E7A5862FD7}" type="slidenum">
-              <a:rPr lang="en-US" smtClean="0"/>
-              <a:t>3</a:t>
-            </a:fld>
-            <a:endParaRPr lang="en-US"/>
-          </a:p>
-        </p:txBody>
-      </p:sp>
-    </p:spTree>
-    <p:extLst>
-      <p:ext uri="{BB962C8B-B14F-4D97-AF65-F5344CB8AC3E}">
-        <p14:creationId xmlns:p14="http://schemas.microsoft.com/office/powerpoint/2010/main" val="448580500"/>
-      </p:ext>
-    </p:extLst>
-  </p:cSld>
-  <p:clrMapOvr>
-    <a:masterClrMapping/>
-  </p:clrMapOvr>
-</p:sld>
-</file>
-
-<file path=ppt/slides/slide30.xml><?xml version="1.0" encoding="utf-8"?>
-<p:sld xmlns:a="http://schemas.openxmlformats.org/drawingml/2006/main" xmlns:r="http://schemas.openxmlformats.org/officeDocument/2006/relationships" xmlns:p="http://schemas.openxmlformats.org/presentationml/2006/main">
-  <p:cSld>
-    <p:spTree>
-      <p:nvGrpSpPr>
-        <p:cNvPr id="1" name=""/>
-        <p:cNvGrpSpPr/>
-        <p:nvPr/>
-      </p:nvGrpSpPr>
-      <p:grpSpPr>
-        <a:xfrm>
-          <a:off x="0" y="0"/>
-          <a:ext cx="0" cy="0"/>
-          <a:chOff x="0" y="0"/>
-          <a:chExt cx="0" cy="0"/>
-        </a:xfrm>
-      </p:grpSpPr>
-      <p:sp>
-        <p:nvSpPr>
-          <p:cNvPr id="4" name="Title 1"/>
-          <p:cNvSpPr>
-            <a:spLocks noGrp="1"/>
-          </p:cNvSpPr>
-          <p:nvPr>
-            <p:ph type="title"/>
-          </p:nvPr>
-        </p:nvSpPr>
-        <p:spPr>
-          <a:xfrm>
             <a:off x="0" y="4005"/>
             <a:ext cx="12192000" cy="720089"/>
           </a:xfrm>
@@ -17094,7 +16467,7 @@
           <a:p>
             <a:fld id="{8CC1885C-3B05-4A16-B158-00E7A5862FD7}" type="slidenum">
               <a:rPr lang="en-US" smtClean="0"/>
-              <a:t>30</a:t>
+              <a:t>29</a:t>
             </a:fld>
             <a:endParaRPr lang="en-US"/>
           </a:p>
@@ -17411,6 +16784,512 @@
 </p:sld>
 </file>
 
+<file path=ppt/slides/slide3.xml><?xml version="1.0" encoding="utf-8"?>
+<p:sld xmlns:a="http://schemas.openxmlformats.org/drawingml/2006/main" xmlns:r="http://schemas.openxmlformats.org/officeDocument/2006/relationships" xmlns:p="http://schemas.openxmlformats.org/presentationml/2006/main">
+  <p:cSld>
+    <p:spTree>
+      <p:nvGrpSpPr>
+        <p:cNvPr id="1" name=""/>
+        <p:cNvGrpSpPr/>
+        <p:nvPr/>
+      </p:nvGrpSpPr>
+      <p:grpSpPr>
+        <a:xfrm>
+          <a:off x="0" y="0"/>
+          <a:ext cx="0" cy="0"/>
+          <a:chOff x="0" y="0"/>
+          <a:chExt cx="0" cy="0"/>
+        </a:xfrm>
+      </p:grpSpPr>
+      <p:sp>
+        <p:nvSpPr>
+          <p:cNvPr id="4" name="Title 1"/>
+          <p:cNvSpPr>
+            <a:spLocks noGrp="1"/>
+          </p:cNvSpPr>
+          <p:nvPr>
+            <p:ph type="title"/>
+          </p:nvPr>
+        </p:nvSpPr>
+        <p:spPr>
+          <a:xfrm>
+            <a:off x="826770" y="6104"/>
+            <a:ext cx="10515600" cy="720089"/>
+          </a:xfrm>
+        </p:spPr>
+        <p:txBody>
+          <a:bodyPr>
+            <a:noAutofit/>
+          </a:bodyPr>
+          <a:lstStyle/>
+          <a:p>
+            <a:pPr algn="ctr"/>
+            <a:r>
+              <a:rPr lang="en-US" sz="3600" dirty="0">
+                <a:latin typeface="Helvetica" charset="0"/>
+                <a:ea typeface="Helvetica" charset="0"/>
+                <a:cs typeface="Helvetica" charset="0"/>
+              </a:rPr>
+              <a:t>Outline</a:t>
+            </a:r>
+          </a:p>
+        </p:txBody>
+      </p:sp>
+      <p:sp>
+        <p:nvSpPr>
+          <p:cNvPr id="5" name="TextBox 4"/>
+          <p:cNvSpPr txBox="1"/>
+          <p:nvPr/>
+        </p:nvSpPr>
+        <p:spPr>
+          <a:xfrm>
+            <a:off x="256272" y="1062488"/>
+            <a:ext cx="11656595" cy="4524315"/>
+          </a:xfrm>
+          <a:prstGeom prst="rect">
+            <a:avLst/>
+          </a:prstGeom>
+          <a:noFill/>
+        </p:spPr>
+        <p:txBody>
+          <a:bodyPr wrap="square" rtlCol="0">
+            <a:spAutoFit/>
+          </a:bodyPr>
+          <a:lstStyle/>
+          <a:p>
+            <a:r>
+              <a:rPr lang="en-US" sz="2400" dirty="0">
+                <a:latin typeface="Helvetica" charset="0"/>
+                <a:ea typeface="Helvetica" charset="0"/>
+                <a:cs typeface="Helvetica" charset="0"/>
+              </a:rPr>
+              <a:t>Part I: Theories of Memory Processing and Learning</a:t>
+            </a:r>
+          </a:p>
+          <a:p>
+            <a:endParaRPr lang="en-US" sz="2400" dirty="0">
+              <a:latin typeface="Helvetica" charset="0"/>
+              <a:ea typeface="Helvetica" charset="0"/>
+              <a:cs typeface="Helvetica" charset="0"/>
+            </a:endParaRPr>
+          </a:p>
+          <a:p>
+            <a:pPr marL="914400" lvl="1" indent="-457200">
+              <a:buFont typeface="+mj-lt"/>
+              <a:buAutoNum type="arabicPeriod"/>
+            </a:pPr>
+            <a:r>
+              <a:rPr lang="en-US" sz="2400" dirty="0">
+                <a:latin typeface="Helvetica" charset="0"/>
+                <a:ea typeface="Helvetica" charset="0"/>
+                <a:cs typeface="Helvetica" charset="0"/>
+              </a:rPr>
+              <a:t>Information Processing Theory</a:t>
+            </a:r>
+          </a:p>
+          <a:p>
+            <a:pPr marL="914400" lvl="1" indent="-457200">
+              <a:buFont typeface="+mj-lt"/>
+              <a:buAutoNum type="arabicPeriod"/>
+            </a:pPr>
+            <a:r>
+              <a:rPr lang="en-US" sz="2400" dirty="0">
+                <a:latin typeface="Helvetica" charset="0"/>
+                <a:ea typeface="Helvetica" charset="0"/>
+                <a:cs typeface="Helvetica" charset="0"/>
+              </a:rPr>
+              <a:t>Cognitive Load Theory</a:t>
+            </a:r>
+          </a:p>
+          <a:p>
+            <a:endParaRPr lang="en-US" sz="2400" dirty="0">
+              <a:latin typeface="Helvetica" charset="0"/>
+              <a:ea typeface="Helvetica" charset="0"/>
+              <a:cs typeface="Helvetica" charset="0"/>
+            </a:endParaRPr>
+          </a:p>
+          <a:p>
+            <a:r>
+              <a:rPr lang="en-US" sz="2400" dirty="0">
+                <a:latin typeface="Helvetica" charset="0"/>
+                <a:ea typeface="Helvetica" charset="0"/>
+                <a:cs typeface="Helvetica" charset="0"/>
+              </a:rPr>
+              <a:t>Part II: Cognitive Load Theory and Course Design</a:t>
+            </a:r>
+          </a:p>
+          <a:p>
+            <a:endParaRPr lang="en-US" sz="2400" dirty="0">
+              <a:latin typeface="Helvetica" charset="0"/>
+              <a:ea typeface="Helvetica" charset="0"/>
+              <a:cs typeface="Helvetica" charset="0"/>
+            </a:endParaRPr>
+          </a:p>
+          <a:p>
+            <a:pPr marL="914400" lvl="1" indent="-457200">
+              <a:buAutoNum type="arabicPeriod"/>
+            </a:pPr>
+            <a:r>
+              <a:rPr lang="en-US" sz="2400" dirty="0">
+                <a:latin typeface="Helvetica" charset="0"/>
+                <a:ea typeface="Helvetica" charset="0"/>
+                <a:cs typeface="Helvetica" charset="0"/>
+              </a:rPr>
+              <a:t>Identify Learner Personas / Types</a:t>
+            </a:r>
+          </a:p>
+          <a:p>
+            <a:pPr marL="914400" lvl="1" indent="-457200">
+              <a:buAutoNum type="arabicPeriod"/>
+            </a:pPr>
+            <a:r>
+              <a:rPr lang="en-US" sz="2400" dirty="0">
+                <a:latin typeface="Helvetica" charset="0"/>
+                <a:ea typeface="Helvetica" charset="0"/>
+                <a:cs typeface="Helvetica" charset="0"/>
+              </a:rPr>
+              <a:t>Mental Models</a:t>
+            </a:r>
+          </a:p>
+          <a:p>
+            <a:pPr marL="914400" lvl="1" indent="-457200">
+              <a:buAutoNum type="arabicPeriod"/>
+            </a:pPr>
+            <a:r>
+              <a:rPr lang="en-US" sz="2400" dirty="0">
+                <a:latin typeface="Helvetica" charset="0"/>
+                <a:ea typeface="Helvetica" charset="0"/>
+                <a:cs typeface="Helvetica" charset="0"/>
+              </a:rPr>
+              <a:t>Formative Assessments</a:t>
+            </a:r>
+          </a:p>
+          <a:p>
+            <a:pPr marL="914400" lvl="1" indent="-457200">
+              <a:buAutoNum type="arabicPeriod"/>
+            </a:pPr>
+            <a:r>
+              <a:rPr lang="en-US" sz="2400" dirty="0">
+                <a:latin typeface="Helvetica" charset="0"/>
+                <a:ea typeface="Helvetica" charset="0"/>
+                <a:cs typeface="Helvetica" charset="0"/>
+              </a:rPr>
+              <a:t>Improving Course Content and Delivery</a:t>
+            </a:r>
+          </a:p>
+          <a:p>
+            <a:pPr marL="914400" lvl="1" indent="-457200">
+              <a:buAutoNum type="arabicPeriod"/>
+            </a:pPr>
+            <a:endParaRPr lang="en-US" sz="2400" dirty="0">
+              <a:latin typeface="Helvetica" charset="0"/>
+              <a:ea typeface="Helvetica" charset="0"/>
+              <a:cs typeface="Helvetica" charset="0"/>
+            </a:endParaRPr>
+          </a:p>
+        </p:txBody>
+      </p:sp>
+      <p:sp>
+        <p:nvSpPr>
+          <p:cNvPr id="2" name="Slide Number Placeholder 1">
+            <a:extLst>
+              <a:ext uri="{FF2B5EF4-FFF2-40B4-BE49-F238E27FC236}">
+                <a16:creationId xmlns:a16="http://schemas.microsoft.com/office/drawing/2014/main" id="{6B712D85-1377-B21F-12ED-DAEADA66B7C5}"/>
+              </a:ext>
+            </a:extLst>
+          </p:cNvPr>
+          <p:cNvSpPr>
+            <a:spLocks noGrp="1"/>
+          </p:cNvSpPr>
+          <p:nvPr>
+            <p:ph type="sldNum" sz="quarter" idx="12"/>
+          </p:nvPr>
+        </p:nvSpPr>
+        <p:spPr/>
+        <p:txBody>
+          <a:bodyPr/>
+          <a:lstStyle/>
+          <a:p>
+            <a:fld id="{8CC1885C-3B05-4A16-B158-00E7A5862FD7}" type="slidenum">
+              <a:rPr lang="en-US" smtClean="0"/>
+              <a:t>3</a:t>
+            </a:fld>
+            <a:endParaRPr lang="en-US"/>
+          </a:p>
+        </p:txBody>
+      </p:sp>
+    </p:spTree>
+    <p:extLst>
+      <p:ext uri="{BB962C8B-B14F-4D97-AF65-F5344CB8AC3E}">
+        <p14:creationId xmlns:p14="http://schemas.microsoft.com/office/powerpoint/2010/main" val="448580500"/>
+      </p:ext>
+    </p:extLst>
+  </p:cSld>
+  <p:clrMapOvr>
+    <a:masterClrMapping/>
+  </p:clrMapOvr>
+</p:sld>
+</file>
+
+<file path=ppt/slides/slide30.xml><?xml version="1.0" encoding="utf-8"?>
+<p:sld xmlns:a="http://schemas.openxmlformats.org/drawingml/2006/main" xmlns:r="http://schemas.openxmlformats.org/officeDocument/2006/relationships" xmlns:p="http://schemas.openxmlformats.org/presentationml/2006/main">
+  <p:cSld>
+    <p:spTree>
+      <p:nvGrpSpPr>
+        <p:cNvPr id="1" name=""/>
+        <p:cNvGrpSpPr/>
+        <p:nvPr/>
+      </p:nvGrpSpPr>
+      <p:grpSpPr>
+        <a:xfrm>
+          <a:off x="0" y="0"/>
+          <a:ext cx="0" cy="0"/>
+          <a:chOff x="0" y="0"/>
+          <a:chExt cx="0" cy="0"/>
+        </a:xfrm>
+      </p:grpSpPr>
+      <p:sp>
+        <p:nvSpPr>
+          <p:cNvPr id="4" name="Title 1"/>
+          <p:cNvSpPr>
+            <a:spLocks noGrp="1"/>
+          </p:cNvSpPr>
+          <p:nvPr>
+            <p:ph type="title"/>
+          </p:nvPr>
+        </p:nvSpPr>
+        <p:spPr>
+          <a:xfrm>
+            <a:off x="0" y="4005"/>
+            <a:ext cx="12192000" cy="720089"/>
+          </a:xfrm>
+        </p:spPr>
+        <p:txBody>
+          <a:bodyPr>
+            <a:noAutofit/>
+          </a:bodyPr>
+          <a:lstStyle/>
+          <a:p>
+            <a:pPr algn="ctr"/>
+            <a:r>
+              <a:rPr lang="en-US" sz="3600" dirty="0">
+                <a:latin typeface="Helvetica" charset="0"/>
+                <a:ea typeface="Helvetica" charset="0"/>
+                <a:cs typeface="Helvetica" charset="0"/>
+              </a:rPr>
+              <a:t>4. Improving course content and delivery</a:t>
+            </a:r>
+          </a:p>
+        </p:txBody>
+      </p:sp>
+      <p:sp>
+        <p:nvSpPr>
+          <p:cNvPr id="6" name="Slide Number Placeholder 5">
+            <a:extLst>
+              <a:ext uri="{FF2B5EF4-FFF2-40B4-BE49-F238E27FC236}">
+                <a16:creationId xmlns:a16="http://schemas.microsoft.com/office/drawing/2014/main" id="{EBBB42AB-36A3-A6C3-059C-66788BD22FA8}"/>
+              </a:ext>
+            </a:extLst>
+          </p:cNvPr>
+          <p:cNvSpPr>
+            <a:spLocks noGrp="1"/>
+          </p:cNvSpPr>
+          <p:nvPr>
+            <p:ph type="sldNum" sz="quarter" idx="12"/>
+          </p:nvPr>
+        </p:nvSpPr>
+        <p:spPr/>
+        <p:txBody>
+          <a:bodyPr/>
+          <a:lstStyle/>
+          <a:p>
+            <a:fld id="{8CC1885C-3B05-4A16-B158-00E7A5862FD7}" type="slidenum">
+              <a:rPr lang="en-US" smtClean="0"/>
+              <a:t>30</a:t>
+            </a:fld>
+            <a:endParaRPr lang="en-US"/>
+          </a:p>
+        </p:txBody>
+      </p:sp>
+      <p:sp>
+        <p:nvSpPr>
+          <p:cNvPr id="8" name="TextBox 7">
+            <a:extLst>
+              <a:ext uri="{FF2B5EF4-FFF2-40B4-BE49-F238E27FC236}">
+                <a16:creationId xmlns:a16="http://schemas.microsoft.com/office/drawing/2014/main" id="{2174DC9D-0E0E-4010-A76B-4921F7AE5380}"/>
+              </a:ext>
+            </a:extLst>
+          </p:cNvPr>
+          <p:cNvSpPr txBox="1"/>
+          <p:nvPr/>
+        </p:nvSpPr>
+        <p:spPr>
+          <a:xfrm>
+            <a:off x="267702" y="935717"/>
+            <a:ext cx="11656595" cy="2677656"/>
+          </a:xfrm>
+          <a:prstGeom prst="rect">
+            <a:avLst/>
+          </a:prstGeom>
+          <a:noFill/>
+        </p:spPr>
+        <p:txBody>
+          <a:bodyPr wrap="square" rtlCol="0">
+            <a:spAutoFit/>
+          </a:bodyPr>
+          <a:lstStyle/>
+          <a:p>
+            <a:pPr marL="342900" indent="-342900">
+              <a:buFont typeface="Arial" panose="020B0604020202020204" pitchFamily="34" charset="0"/>
+              <a:buChar char="•"/>
+            </a:pPr>
+            <a:r>
+              <a:rPr lang="en-US" sz="2400" dirty="0">
+                <a:latin typeface="Helvetica" charset="0"/>
+                <a:ea typeface="Helvetica" charset="0"/>
+                <a:cs typeface="Helvetica" charset="0"/>
+              </a:rPr>
+              <a:t>Go slow and repeat if necessary</a:t>
+            </a:r>
+          </a:p>
+          <a:p>
+            <a:pPr marL="342900" indent="-342900">
+              <a:buFont typeface="Arial" panose="020B0604020202020204" pitchFamily="34" charset="0"/>
+              <a:buChar char="•"/>
+            </a:pPr>
+            <a:endParaRPr lang="en-US" sz="2400" dirty="0">
+              <a:latin typeface="Helvetica" charset="0"/>
+              <a:ea typeface="Helvetica" charset="0"/>
+              <a:cs typeface="Helvetica" charset="0"/>
+            </a:endParaRPr>
+          </a:p>
+          <a:p>
+            <a:pPr marL="342900" indent="-342900">
+              <a:buFont typeface="Arial" panose="020B0604020202020204" pitchFamily="34" charset="0"/>
+              <a:buChar char="•"/>
+            </a:pPr>
+            <a:r>
+              <a:rPr lang="en-US" sz="2400" dirty="0">
+                <a:latin typeface="Helvetica" charset="0"/>
+                <a:ea typeface="Helvetica" charset="0"/>
+                <a:cs typeface="Helvetica" charset="0"/>
+              </a:rPr>
+              <a:t>Be aware of expert blind spots</a:t>
+            </a:r>
+          </a:p>
+          <a:p>
+            <a:pPr marL="342900" indent="-342900">
+              <a:buFont typeface="Arial" panose="020B0604020202020204" pitchFamily="34" charset="0"/>
+              <a:buChar char="•"/>
+            </a:pPr>
+            <a:endParaRPr lang="en-US" sz="2400" dirty="0">
+              <a:latin typeface="Helvetica" charset="0"/>
+              <a:ea typeface="Helvetica" charset="0"/>
+              <a:cs typeface="Helvetica" charset="0"/>
+            </a:endParaRPr>
+          </a:p>
+          <a:p>
+            <a:pPr marL="342900" indent="-342900">
+              <a:buFont typeface="Arial" panose="020B0604020202020204" pitchFamily="34" charset="0"/>
+              <a:buChar char="•"/>
+            </a:pPr>
+            <a:r>
+              <a:rPr lang="en-US" sz="2400" dirty="0">
+                <a:latin typeface="Helvetica" charset="0"/>
+                <a:ea typeface="Helvetica" charset="0"/>
+                <a:cs typeface="Helvetica" charset="0"/>
+              </a:rPr>
+              <a:t>Use authentic tasks and examples to teach</a:t>
+            </a:r>
+          </a:p>
+          <a:p>
+            <a:pPr marL="342900" indent="-342900">
+              <a:buFont typeface="Arial" panose="020B0604020202020204" pitchFamily="34" charset="0"/>
+              <a:buChar char="•"/>
+            </a:pPr>
+            <a:endParaRPr lang="en-US" sz="2400" i="0" dirty="0">
+              <a:solidFill>
+                <a:srgbClr val="383838"/>
+              </a:solidFill>
+              <a:effectLst/>
+              <a:latin typeface="Helvetica" charset="0"/>
+              <a:cs typeface="Helvetica" charset="0"/>
+            </a:endParaRPr>
+          </a:p>
+          <a:p>
+            <a:pPr marL="342900" indent="-342900">
+              <a:buFont typeface="Arial" panose="020B0604020202020204" pitchFamily="34" charset="0"/>
+              <a:buChar char="•"/>
+            </a:pPr>
+            <a:r>
+              <a:rPr lang="en-US" sz="2400" dirty="0">
+                <a:solidFill>
+                  <a:srgbClr val="383838"/>
+                </a:solidFill>
+                <a:latin typeface="Helvetica" charset="0"/>
+                <a:cs typeface="Helvetica" charset="0"/>
+              </a:rPr>
+              <a:t>Give and receive appropriate feedback</a:t>
+            </a:r>
+            <a:endParaRPr lang="en-US" sz="2400" dirty="0">
+              <a:latin typeface="Helvetica" charset="0"/>
+              <a:ea typeface="Helvetica" charset="0"/>
+              <a:cs typeface="Helvetica" charset="0"/>
+            </a:endParaRPr>
+          </a:p>
+        </p:txBody>
+      </p:sp>
+      <p:sp>
+        <p:nvSpPr>
+          <p:cNvPr id="5" name="TextBox 4">
+            <a:extLst>
+              <a:ext uri="{FF2B5EF4-FFF2-40B4-BE49-F238E27FC236}">
+                <a16:creationId xmlns:a16="http://schemas.microsoft.com/office/drawing/2014/main" id="{09683464-2F68-ECE8-6DFF-251F15082687}"/>
+              </a:ext>
+            </a:extLst>
+          </p:cNvPr>
+          <p:cNvSpPr txBox="1"/>
+          <p:nvPr/>
+        </p:nvSpPr>
+        <p:spPr>
+          <a:xfrm>
+            <a:off x="0" y="6502652"/>
+            <a:ext cx="5139396" cy="338554"/>
+          </a:xfrm>
+          <a:prstGeom prst="rect">
+            <a:avLst/>
+          </a:prstGeom>
+          <a:noFill/>
+        </p:spPr>
+        <p:txBody>
+          <a:bodyPr wrap="square">
+            <a:spAutoFit/>
+          </a:bodyPr>
+          <a:lstStyle/>
+          <a:p>
+            <a:pPr marL="342900" indent="-342900">
+              <a:buAutoNum type="arabicPeriod"/>
+            </a:pPr>
+            <a:r>
+              <a:rPr lang="en-US" sz="1600" dirty="0"/>
+              <a:t>https://carpentries.github.io/instructor-training/</a:t>
+            </a:r>
+          </a:p>
+        </p:txBody>
+      </p:sp>
+    </p:spTree>
+    <p:extLst>
+      <p:ext uri="{BB962C8B-B14F-4D97-AF65-F5344CB8AC3E}">
+        <p14:creationId xmlns:p14="http://schemas.microsoft.com/office/powerpoint/2010/main" val="1119497102"/>
+      </p:ext>
+    </p:extLst>
+  </p:cSld>
+  <p:clrMapOvr>
+    <a:masterClrMapping/>
+  </p:clrMapOvr>
+</p:sld>
+</file>
+
 <file path=ppt/slides/slide31.xml><?xml version="1.0" encoding="utf-8"?>
 <p:sld xmlns:a="http://schemas.openxmlformats.org/drawingml/2006/main" xmlns:r="http://schemas.openxmlformats.org/officeDocument/2006/relationships" xmlns:p="http://schemas.openxmlformats.org/presentationml/2006/main">
   <p:cSld>
@@ -17440,265 +17319,6 @@
         </p:nvSpPr>
         <p:spPr>
           <a:xfrm>
-            <a:off x="0" y="4005"/>
-            <a:ext cx="12192000" cy="720089"/>
-          </a:xfrm>
-        </p:spPr>
-        <p:txBody>
-          <a:bodyPr>
-            <a:noAutofit/>
-          </a:bodyPr>
-          <a:lstStyle/>
-          <a:p>
-            <a:pPr algn="ctr"/>
-            <a:r>
-              <a:rPr lang="en-US" sz="3600" dirty="0">
-                <a:latin typeface="Helvetica" charset="0"/>
-                <a:ea typeface="Helvetica" charset="0"/>
-                <a:cs typeface="Helvetica" charset="0"/>
-              </a:rPr>
-              <a:t>4. Improving course content and delivery</a:t>
-            </a:r>
-          </a:p>
-        </p:txBody>
-      </p:sp>
-      <p:sp>
-        <p:nvSpPr>
-          <p:cNvPr id="6" name="Slide Number Placeholder 5">
-            <a:extLst>
-              <a:ext uri="{FF2B5EF4-FFF2-40B4-BE49-F238E27FC236}">
-                <a16:creationId xmlns:a16="http://schemas.microsoft.com/office/drawing/2014/main" id="{EBBB42AB-36A3-A6C3-059C-66788BD22FA8}"/>
-              </a:ext>
-            </a:extLst>
-          </p:cNvPr>
-          <p:cNvSpPr>
-            <a:spLocks noGrp="1"/>
-          </p:cNvSpPr>
-          <p:nvPr>
-            <p:ph type="sldNum" sz="quarter" idx="12"/>
-          </p:nvPr>
-        </p:nvSpPr>
-        <p:spPr/>
-        <p:txBody>
-          <a:bodyPr/>
-          <a:lstStyle/>
-          <a:p>
-            <a:fld id="{8CC1885C-3B05-4A16-B158-00E7A5862FD7}" type="slidenum">
-              <a:rPr lang="en-US" smtClean="0"/>
-              <a:t>31</a:t>
-            </a:fld>
-            <a:endParaRPr lang="en-US"/>
-          </a:p>
-        </p:txBody>
-      </p:sp>
-      <p:sp>
-        <p:nvSpPr>
-          <p:cNvPr id="8" name="TextBox 7">
-            <a:extLst>
-              <a:ext uri="{FF2B5EF4-FFF2-40B4-BE49-F238E27FC236}">
-                <a16:creationId xmlns:a16="http://schemas.microsoft.com/office/drawing/2014/main" id="{2174DC9D-0E0E-4010-A76B-4921F7AE5380}"/>
-              </a:ext>
-            </a:extLst>
-          </p:cNvPr>
-          <p:cNvSpPr txBox="1"/>
-          <p:nvPr/>
-        </p:nvSpPr>
-        <p:spPr>
-          <a:xfrm>
-            <a:off x="267702" y="935717"/>
-            <a:ext cx="11656595" cy="2677656"/>
-          </a:xfrm>
-          <a:prstGeom prst="rect">
-            <a:avLst/>
-          </a:prstGeom>
-          <a:noFill/>
-        </p:spPr>
-        <p:txBody>
-          <a:bodyPr wrap="square" rtlCol="0">
-            <a:spAutoFit/>
-          </a:bodyPr>
-          <a:lstStyle/>
-          <a:p>
-            <a:pPr marL="342900" indent="-342900">
-              <a:buFont typeface="Arial" panose="020B0604020202020204" pitchFamily="34" charset="0"/>
-              <a:buChar char="•"/>
-            </a:pPr>
-            <a:r>
-              <a:rPr lang="en-US" sz="2400" dirty="0">
-                <a:latin typeface="Helvetica" charset="0"/>
-                <a:ea typeface="Helvetica" charset="0"/>
-                <a:cs typeface="Helvetica" charset="0"/>
-              </a:rPr>
-              <a:t>Go slow and repeat if necessary</a:t>
-            </a:r>
-          </a:p>
-          <a:p>
-            <a:pPr marL="342900" indent="-342900">
-              <a:buFont typeface="Arial" panose="020B0604020202020204" pitchFamily="34" charset="0"/>
-              <a:buChar char="•"/>
-            </a:pPr>
-            <a:endParaRPr lang="en-US" sz="2400" dirty="0">
-              <a:latin typeface="Helvetica" charset="0"/>
-              <a:ea typeface="Helvetica" charset="0"/>
-              <a:cs typeface="Helvetica" charset="0"/>
-            </a:endParaRPr>
-          </a:p>
-          <a:p>
-            <a:pPr marL="342900" indent="-342900">
-              <a:buFont typeface="Arial" panose="020B0604020202020204" pitchFamily="34" charset="0"/>
-              <a:buChar char="•"/>
-            </a:pPr>
-            <a:r>
-              <a:rPr lang="en-US" sz="2400" dirty="0">
-                <a:latin typeface="Helvetica" charset="0"/>
-                <a:ea typeface="Helvetica" charset="0"/>
-                <a:cs typeface="Helvetica" charset="0"/>
-              </a:rPr>
-              <a:t>Be aware of expert blind spots</a:t>
-            </a:r>
-          </a:p>
-          <a:p>
-            <a:pPr marL="342900" indent="-342900">
-              <a:buFont typeface="Arial" panose="020B0604020202020204" pitchFamily="34" charset="0"/>
-              <a:buChar char="•"/>
-            </a:pPr>
-            <a:endParaRPr lang="en-US" sz="2400" dirty="0">
-              <a:latin typeface="Helvetica" charset="0"/>
-              <a:ea typeface="Helvetica" charset="0"/>
-              <a:cs typeface="Helvetica" charset="0"/>
-            </a:endParaRPr>
-          </a:p>
-          <a:p>
-            <a:pPr marL="342900" indent="-342900">
-              <a:buFont typeface="Arial" panose="020B0604020202020204" pitchFamily="34" charset="0"/>
-              <a:buChar char="•"/>
-            </a:pPr>
-            <a:r>
-              <a:rPr lang="en-US" sz="2400" dirty="0">
-                <a:latin typeface="Helvetica" charset="0"/>
-                <a:ea typeface="Helvetica" charset="0"/>
-                <a:cs typeface="Helvetica" charset="0"/>
-              </a:rPr>
-              <a:t>Use authentic tasks and examples to teach</a:t>
-            </a:r>
-          </a:p>
-          <a:p>
-            <a:pPr marL="342900" indent="-342900">
-              <a:buFont typeface="Arial" panose="020B0604020202020204" pitchFamily="34" charset="0"/>
-              <a:buChar char="•"/>
-            </a:pPr>
-            <a:endParaRPr lang="en-US" sz="2400" i="0" dirty="0">
-              <a:solidFill>
-                <a:srgbClr val="383838"/>
-              </a:solidFill>
-              <a:effectLst/>
-              <a:latin typeface="Helvetica" charset="0"/>
-              <a:cs typeface="Helvetica" charset="0"/>
-            </a:endParaRPr>
-          </a:p>
-          <a:p>
-            <a:pPr marL="342900" indent="-342900">
-              <a:buFont typeface="Arial" panose="020B0604020202020204" pitchFamily="34" charset="0"/>
-              <a:buChar char="•"/>
-            </a:pPr>
-            <a:r>
-              <a:rPr lang="en-US" sz="2400" dirty="0">
-                <a:solidFill>
-                  <a:srgbClr val="383838"/>
-                </a:solidFill>
-                <a:latin typeface="Helvetica" charset="0"/>
-                <a:cs typeface="Helvetica" charset="0"/>
-              </a:rPr>
-              <a:t>Give and receive appropriate feedback</a:t>
-            </a:r>
-            <a:endParaRPr lang="en-US" sz="2400" dirty="0">
-              <a:latin typeface="Helvetica" charset="0"/>
-              <a:ea typeface="Helvetica" charset="0"/>
-              <a:cs typeface="Helvetica" charset="0"/>
-            </a:endParaRPr>
-          </a:p>
-        </p:txBody>
-      </p:sp>
-      <p:sp>
-        <p:nvSpPr>
-          <p:cNvPr id="5" name="TextBox 4">
-            <a:extLst>
-              <a:ext uri="{FF2B5EF4-FFF2-40B4-BE49-F238E27FC236}">
-                <a16:creationId xmlns:a16="http://schemas.microsoft.com/office/drawing/2014/main" id="{09683464-2F68-ECE8-6DFF-251F15082687}"/>
-              </a:ext>
-            </a:extLst>
-          </p:cNvPr>
-          <p:cNvSpPr txBox="1"/>
-          <p:nvPr/>
-        </p:nvSpPr>
-        <p:spPr>
-          <a:xfrm>
-            <a:off x="0" y="6502652"/>
-            <a:ext cx="5139396" cy="338554"/>
-          </a:xfrm>
-          <a:prstGeom prst="rect">
-            <a:avLst/>
-          </a:prstGeom>
-          <a:noFill/>
-        </p:spPr>
-        <p:txBody>
-          <a:bodyPr wrap="square">
-            <a:spAutoFit/>
-          </a:bodyPr>
-          <a:lstStyle/>
-          <a:p>
-            <a:pPr marL="342900" indent="-342900">
-              <a:buAutoNum type="arabicPeriod"/>
-            </a:pPr>
-            <a:r>
-              <a:rPr lang="en-US" sz="1600" dirty="0"/>
-              <a:t>https://carpentries.github.io/instructor-training/</a:t>
-            </a:r>
-          </a:p>
-        </p:txBody>
-      </p:sp>
-    </p:spTree>
-    <p:extLst>
-      <p:ext uri="{BB962C8B-B14F-4D97-AF65-F5344CB8AC3E}">
-        <p14:creationId xmlns:p14="http://schemas.microsoft.com/office/powerpoint/2010/main" val="1119497102"/>
-      </p:ext>
-    </p:extLst>
-  </p:cSld>
-  <p:clrMapOvr>
-    <a:masterClrMapping/>
-  </p:clrMapOvr>
-</p:sld>
-</file>
-
-<file path=ppt/slides/slide32.xml><?xml version="1.0" encoding="utf-8"?>
-<p:sld xmlns:a="http://schemas.openxmlformats.org/drawingml/2006/main" xmlns:r="http://schemas.openxmlformats.org/officeDocument/2006/relationships" xmlns:p="http://schemas.openxmlformats.org/presentationml/2006/main">
-  <p:cSld>
-    <p:spTree>
-      <p:nvGrpSpPr>
-        <p:cNvPr id="1" name=""/>
-        <p:cNvGrpSpPr/>
-        <p:nvPr/>
-      </p:nvGrpSpPr>
-      <p:grpSpPr>
-        <a:xfrm>
-          <a:off x="0" y="0"/>
-          <a:ext cx="0" cy="0"/>
-          <a:chOff x="0" y="0"/>
-          <a:chExt cx="0" cy="0"/>
-        </a:xfrm>
-      </p:grpSpPr>
-      <p:sp>
-        <p:nvSpPr>
-          <p:cNvPr id="4" name="Title 1"/>
-          <p:cNvSpPr>
-            <a:spLocks noGrp="1"/>
-          </p:cNvSpPr>
-          <p:nvPr>
-            <p:ph type="title"/>
-          </p:nvPr>
-        </p:nvSpPr>
-        <p:spPr>
-          <a:xfrm>
             <a:off x="826770" y="6104"/>
             <a:ext cx="10515600" cy="720089"/>
           </a:xfrm>
@@ -17831,7 +17451,7 @@
           <a:p>
             <a:fld id="{8CC1885C-3B05-4A16-B158-00E7A5862FD7}" type="slidenum">
               <a:rPr lang="en-US" smtClean="0"/>
-              <a:t>32</a:t>
+              <a:t>31</a:t>
             </a:fld>
             <a:endParaRPr lang="en-US"/>
           </a:p>
@@ -17850,7 +17470,7 @@
 </p:sld>
 </file>
 
-<file path=ppt/slides/slide33.xml><?xml version="1.0" encoding="utf-8"?>
+<file path=ppt/slides/slide32.xml><?xml version="1.0" encoding="utf-8"?>
 <p:sld xmlns:a="http://schemas.openxmlformats.org/drawingml/2006/main" xmlns:r="http://schemas.openxmlformats.org/officeDocument/2006/relationships" xmlns:p="http://schemas.openxmlformats.org/presentationml/2006/main">
   <p:cSld>
     <p:spTree>
@@ -18277,7 +17897,7 @@
           <a:p>
             <a:fld id="{8CC1885C-3B05-4A16-B158-00E7A5862FD7}" type="slidenum">
               <a:rPr lang="en-US" smtClean="0"/>
-              <a:t>33</a:t>
+              <a:t>32</a:t>
             </a:fld>
             <a:endParaRPr lang="en-US"/>
           </a:p>
@@ -18419,7 +18039,7 @@
 </p:sld>
 </file>
 
-<file path=ppt/slides/slide34.xml><?xml version="1.0" encoding="utf-8"?>
+<file path=ppt/slides/slide33.xml><?xml version="1.0" encoding="utf-8"?>
 <p:sld xmlns:a="http://schemas.openxmlformats.org/drawingml/2006/main" xmlns:r="http://schemas.openxmlformats.org/officeDocument/2006/relationships" xmlns:p="http://schemas.openxmlformats.org/presentationml/2006/main">
   <p:cSld>
     <p:spTree>
@@ -18493,7 +18113,7 @@
           <a:p>
             <a:fld id="{8CC1885C-3B05-4A16-B158-00E7A5862FD7}" type="slidenum">
               <a:rPr lang="en-US" smtClean="0"/>
-              <a:t>34</a:t>
+              <a:t>33</a:t>
             </a:fld>
             <a:endParaRPr lang="en-US"/>
           </a:p>
@@ -19755,7 +19375,7 @@
         </p:blipFill>
         <p:spPr>
           <a:xfrm>
-            <a:off x="432530" y="1719122"/>
+            <a:off x="432530" y="1743836"/>
             <a:ext cx="11326940" cy="3899568"/>
           </a:xfrm>
           <a:prstGeom prst="rect">

</xml_diff>